<commit_message>
feature, test branch for nexopixel
</commit_message>
<xml_diff>
--- a/doc/01_electronics/pin_assign.pptx
+++ b/doc/01_electronics/pin_assign.pptx
@@ -104,6 +104,11 @@
       </a:defRPr>
     </a:lvl9pPr>
   </p:defaultTextStyle>
+  <p:extLst>
+    <p:ext uri="{EFAFB233-063F-42B5-8137-9DF3F51BA10A}">
+      <p15:sldGuideLst xmlns:p15="http://schemas.microsoft.com/office/powerpoint/2012/main"/>
+    </p:ext>
+  </p:extLst>
 </p:presentation>
 </file>
 
@@ -254,7 +259,7 @@
           <a:p>
             <a:fld id="{902A0653-22C5-4F38-AF77-5E9C705D9DF0}" type="datetimeFigureOut">
               <a:rPr kumimoji="1" lang="ja-JP" altLang="en-US" smtClean="0"/>
-              <a:t>2024/4/11</a:t>
+              <a:t>2024/4/23</a:t>
             </a:fld>
             <a:endParaRPr kumimoji="1" lang="ja-JP" altLang="en-US"/>
           </a:p>
@@ -484,7 +489,7 @@
           <a:p>
             <a:fld id="{902A0653-22C5-4F38-AF77-5E9C705D9DF0}" type="datetimeFigureOut">
               <a:rPr kumimoji="1" lang="ja-JP" altLang="en-US" smtClean="0"/>
-              <a:t>2024/4/11</a:t>
+              <a:t>2024/4/23</a:t>
             </a:fld>
             <a:endParaRPr kumimoji="1" lang="ja-JP" altLang="en-US"/>
           </a:p>
@@ -724,7 +729,7 @@
           <a:p>
             <a:fld id="{902A0653-22C5-4F38-AF77-5E9C705D9DF0}" type="datetimeFigureOut">
               <a:rPr kumimoji="1" lang="ja-JP" altLang="en-US" smtClean="0"/>
-              <a:t>2024/4/11</a:t>
+              <a:t>2024/4/23</a:t>
             </a:fld>
             <a:endParaRPr kumimoji="1" lang="ja-JP" altLang="en-US"/>
           </a:p>
@@ -954,7 +959,7 @@
           <a:p>
             <a:fld id="{902A0653-22C5-4F38-AF77-5E9C705D9DF0}" type="datetimeFigureOut">
               <a:rPr kumimoji="1" lang="ja-JP" altLang="en-US" smtClean="0"/>
-              <a:t>2024/4/11</a:t>
+              <a:t>2024/4/23</a:t>
             </a:fld>
             <a:endParaRPr kumimoji="1" lang="ja-JP" altLang="en-US"/>
           </a:p>
@@ -1229,7 +1234,7 @@
           <a:p>
             <a:fld id="{902A0653-22C5-4F38-AF77-5E9C705D9DF0}" type="datetimeFigureOut">
               <a:rPr kumimoji="1" lang="ja-JP" altLang="en-US" smtClean="0"/>
-              <a:t>2024/4/11</a:t>
+              <a:t>2024/4/23</a:t>
             </a:fld>
             <a:endParaRPr kumimoji="1" lang="ja-JP" altLang="en-US"/>
           </a:p>
@@ -1558,7 +1563,7 @@
           <a:p>
             <a:fld id="{902A0653-22C5-4F38-AF77-5E9C705D9DF0}" type="datetimeFigureOut">
               <a:rPr kumimoji="1" lang="ja-JP" altLang="en-US" smtClean="0"/>
-              <a:t>2024/4/11</a:t>
+              <a:t>2024/4/23</a:t>
             </a:fld>
             <a:endParaRPr kumimoji="1" lang="ja-JP" altLang="en-US"/>
           </a:p>
@@ -2034,7 +2039,7 @@
           <a:p>
             <a:fld id="{902A0653-22C5-4F38-AF77-5E9C705D9DF0}" type="datetimeFigureOut">
               <a:rPr kumimoji="1" lang="ja-JP" altLang="en-US" smtClean="0"/>
-              <a:t>2024/4/11</a:t>
+              <a:t>2024/4/23</a:t>
             </a:fld>
             <a:endParaRPr kumimoji="1" lang="ja-JP" altLang="en-US"/>
           </a:p>
@@ -2175,7 +2180,7 @@
           <a:p>
             <a:fld id="{902A0653-22C5-4F38-AF77-5E9C705D9DF0}" type="datetimeFigureOut">
               <a:rPr kumimoji="1" lang="ja-JP" altLang="en-US" smtClean="0"/>
-              <a:t>2024/4/11</a:t>
+              <a:t>2024/4/23</a:t>
             </a:fld>
             <a:endParaRPr kumimoji="1" lang="ja-JP" altLang="en-US"/>
           </a:p>
@@ -2288,7 +2293,7 @@
           <a:p>
             <a:fld id="{902A0653-22C5-4F38-AF77-5E9C705D9DF0}" type="datetimeFigureOut">
               <a:rPr kumimoji="1" lang="ja-JP" altLang="en-US" smtClean="0"/>
-              <a:t>2024/4/11</a:t>
+              <a:t>2024/4/23</a:t>
             </a:fld>
             <a:endParaRPr kumimoji="1" lang="ja-JP" altLang="en-US"/>
           </a:p>
@@ -2631,7 +2636,7 @@
           <a:p>
             <a:fld id="{902A0653-22C5-4F38-AF77-5E9C705D9DF0}" type="datetimeFigureOut">
               <a:rPr kumimoji="1" lang="ja-JP" altLang="en-US" smtClean="0"/>
-              <a:t>2024/4/11</a:t>
+              <a:t>2024/4/23</a:t>
             </a:fld>
             <a:endParaRPr kumimoji="1" lang="ja-JP" altLang="en-US"/>
           </a:p>
@@ -2919,7 +2924,7 @@
           <a:p>
             <a:fld id="{902A0653-22C5-4F38-AF77-5E9C705D9DF0}" type="datetimeFigureOut">
               <a:rPr kumimoji="1" lang="ja-JP" altLang="en-US" smtClean="0"/>
-              <a:t>2024/4/11</a:t>
+              <a:t>2024/4/23</a:t>
             </a:fld>
             <a:endParaRPr kumimoji="1" lang="ja-JP" altLang="en-US"/>
           </a:p>
@@ -3192,7 +3197,7 @@
           <a:p>
             <a:fld id="{902A0653-22C5-4F38-AF77-5E9C705D9DF0}" type="datetimeFigureOut">
               <a:rPr kumimoji="1" lang="ja-JP" altLang="en-US" smtClean="0"/>
-              <a:t>2024/4/11</a:t>
+              <a:t>2024/4/23</a:t>
             </a:fld>
             <a:endParaRPr kumimoji="1" lang="ja-JP" altLang="en-US"/>
           </a:p>
@@ -4593,8 +4598,8 @@
         </p:nvSpPr>
         <p:spPr>
           <a:xfrm>
-            <a:off x="1683346" y="2617179"/>
-            <a:ext cx="433132" cy="215444"/>
+            <a:off x="1204049" y="2617179"/>
+            <a:ext cx="912429" cy="215444"/>
           </a:xfrm>
           <a:prstGeom prst="rect">
             <a:avLst/>
@@ -4617,7 +4622,7 @@
                 <a:latin typeface="Meiryo UI" panose="020B0604030504040204" pitchFamily="50" charset="-128"/>
                 <a:ea typeface="Meiryo UI" panose="020B0604030504040204" pitchFamily="50" charset="-128"/>
               </a:rPr>
-              <a:t>PWM</a:t>
+              <a:t>PWM for audio</a:t>
             </a:r>
             <a:endParaRPr kumimoji="1" lang="ja-JP" altLang="en-US" sz="800" dirty="0">
               <a:solidFill>
@@ -4718,6 +4723,66 @@
                 <a:ea typeface="Meiryo UI" panose="020B0604030504040204" pitchFamily="50" charset="-128"/>
               </a:rPr>
               <a:t>Serial</a:t>
+            </a:r>
+            <a:endParaRPr kumimoji="1" lang="ja-JP" altLang="en-US" sz="800" dirty="0">
+              <a:solidFill>
+                <a:schemeClr val="bg1"/>
+              </a:solidFill>
+              <a:latin typeface="Meiryo UI" panose="020B0604030504040204" pitchFamily="50" charset="-128"/>
+              <a:ea typeface="Meiryo UI" panose="020B0604030504040204" pitchFamily="50" charset="-128"/>
+            </a:endParaRPr>
+          </a:p>
+        </p:txBody>
+      </p:sp>
+      <p:sp>
+        <p:nvSpPr>
+          <p:cNvPr id="2" name="テキスト ボックス 1">
+            <a:extLst>
+              <a:ext uri="{FF2B5EF4-FFF2-40B4-BE49-F238E27FC236}">
+                <a16:creationId xmlns:a16="http://schemas.microsoft.com/office/drawing/2014/main" id="{570A234F-8D81-88E8-65F9-0766670B831B}"/>
+              </a:ext>
+            </a:extLst>
+          </p:cNvPr>
+          <p:cNvSpPr txBox="1"/>
+          <p:nvPr/>
+        </p:nvSpPr>
+        <p:spPr>
+          <a:xfrm>
+            <a:off x="1051763" y="2414575"/>
+            <a:ext cx="1064715" cy="215444"/>
+          </a:xfrm>
+          <a:prstGeom prst="rect">
+            <a:avLst/>
+          </a:prstGeom>
+          <a:solidFill>
+            <a:srgbClr val="FF0000"/>
+          </a:solidFill>
+        </p:spPr>
+        <p:txBody>
+          <a:bodyPr wrap="none" rtlCol="0">
+            <a:spAutoFit/>
+          </a:bodyPr>
+          <a:lstStyle/>
+          <a:p>
+            <a:r>
+              <a:rPr kumimoji="1" lang="en-US" altLang="ja-JP" sz="800" dirty="0">
+                <a:solidFill>
+                  <a:schemeClr val="bg1"/>
+                </a:solidFill>
+                <a:latin typeface="Meiryo UI" panose="020B0604030504040204" pitchFamily="50" charset="-128"/>
+                <a:ea typeface="Meiryo UI" panose="020B0604030504040204" pitchFamily="50" charset="-128"/>
+              </a:rPr>
+              <a:t>PWM for </a:t>
+            </a:r>
+            <a:r>
+              <a:rPr kumimoji="1" lang="en-US" altLang="ja-JP" sz="800" dirty="0" err="1">
+                <a:solidFill>
+                  <a:schemeClr val="bg1"/>
+                </a:solidFill>
+                <a:latin typeface="Meiryo UI" panose="020B0604030504040204" pitchFamily="50" charset="-128"/>
+                <a:ea typeface="Meiryo UI" panose="020B0604030504040204" pitchFamily="50" charset="-128"/>
+              </a:rPr>
+              <a:t>NeoPixel</a:t>
             </a:r>
             <a:endParaRPr kumimoji="1" lang="ja-JP" altLang="en-US" sz="800" dirty="0">
               <a:solidFill>

</xml_diff>